<commit_message>
added more details to slides
</commit_message>
<xml_diff>
--- a/lectures/2. Quantization and _entropy coding.pptx
+++ b/lectures/2. Quantization and _entropy coding.pptx
@@ -1067,7 +1067,7 @@
         </p:nvSpPr>
         <p:spPr>
           <a:xfrm>
-            <a:off x="381300" y="685800"/>
+            <a:off x="381000" y="685800"/>
             <a:ext cx="6096000" cy="3429000"/>
           </a:xfrm>
           <a:custGeom>
@@ -1130,7 +1130,7 @@
               </a:spcAft>
               <a:buNone/>
             </a:pPr>
-            <a:endParaRPr/>
+            <a:endParaRPr dirty="0"/>
           </a:p>
         </p:txBody>
       </p:sp>
@@ -8316,83 +8316,6 @@
           <a:chExt cx="0" cy="0"/>
         </a:xfrm>
       </p:grpSpPr>
-      <p:sp>
-        <p:nvSpPr>
-          <p:cNvPr id="109" name="Google Shape;109;p21"/>
-          <p:cNvSpPr txBox="1">
-            <a:spLocks noGrp="1"/>
-          </p:cNvSpPr>
-          <p:nvPr>
-            <p:ph type="body" idx="1"/>
-          </p:nvPr>
-        </p:nvSpPr>
-        <p:spPr>
-          <a:xfrm>
-            <a:off x="129550" y="695275"/>
-            <a:ext cx="8907900" cy="2482200"/>
-          </a:xfrm>
-          <a:prstGeom prst="rect">
-            <a:avLst/>
-          </a:prstGeom>
-        </p:spPr>
-        <p:txBody>
-          <a:bodyPr spcFirstLastPara="1" wrap="square" lIns="91425" tIns="91425" rIns="91425" bIns="91425" anchor="t" anchorCtr="0">
-            <a:normAutofit/>
-          </a:bodyPr>
-          <a:lstStyle/>
-          <a:p>
-            <a:pPr marL="457200" lvl="0" indent="-342900" algn="l" rtl="0">
-              <a:spcBef>
-                <a:spcPts val="0"/>
-              </a:spcBef>
-              <a:spcAft>
-                <a:spcPts val="0"/>
-              </a:spcAft>
-              <a:buSzPts val="1800"/>
-              <a:buChar char="●"/>
-            </a:pPr>
-            <a:r>
-              <a:rPr lang="en"/>
-              <a:t>Non-uniform PCM quantizers use a non uniform step size that can be determined from the statistical structure of the signal.</a:t>
-            </a:r>
-            <a:endParaRPr/>
-          </a:p>
-          <a:p>
-            <a:pPr marL="457200" lvl="0" indent="-342900" algn="l" rtl="0">
-              <a:spcBef>
-                <a:spcPts val="0"/>
-              </a:spcBef>
-              <a:spcAft>
-                <a:spcPts val="0"/>
-              </a:spcAft>
-              <a:buSzPts val="1800"/>
-              <a:buChar char="●"/>
-            </a:pPr>
-            <a:r>
-              <a:rPr lang="en"/>
-              <a:t>PDF-optimized PCM uses fine step sizes for frequently occurring amplitudes and coarse step sizes for less frequently occurring amplitudes.</a:t>
-            </a:r>
-            <a:endParaRPr/>
-          </a:p>
-          <a:p>
-            <a:pPr marL="457200" lvl="0" indent="-342900" algn="l" rtl="0">
-              <a:spcBef>
-                <a:spcPts val="0"/>
-              </a:spcBef>
-              <a:spcAft>
-                <a:spcPts val="0"/>
-              </a:spcAft>
-              <a:buSzPts val="1800"/>
-              <a:buChar char="●"/>
-            </a:pPr>
-            <a:r>
-              <a:rPr lang="en"/>
-              <a:t>A signal with a Gaussian PDF can be quantized more efficiently by computing the quantization step sizes and the corresponding centroids such that the mean square quantization noise is minimized.</a:t>
-            </a:r>
-            <a:endParaRPr/>
-          </a:p>
-        </p:txBody>
-      </p:sp>
       <p:pic>
         <p:nvPicPr>
           <p:cNvPr id="110" name="Google Shape;110;p21"/>
@@ -8420,6 +8343,83 @@
           </a:ln>
         </p:spPr>
       </p:pic>
+      <p:sp>
+        <p:nvSpPr>
+          <p:cNvPr id="109" name="Google Shape;109;p21"/>
+          <p:cNvSpPr txBox="1">
+            <a:spLocks noGrp="1"/>
+          </p:cNvSpPr>
+          <p:nvPr>
+            <p:ph type="body" idx="1"/>
+          </p:nvPr>
+        </p:nvSpPr>
+        <p:spPr>
+          <a:xfrm>
+            <a:off x="129550" y="695275"/>
+            <a:ext cx="8907900" cy="2482200"/>
+          </a:xfrm>
+          <a:prstGeom prst="rect">
+            <a:avLst/>
+          </a:prstGeom>
+        </p:spPr>
+        <p:txBody>
+          <a:bodyPr spcFirstLastPara="1" wrap="square" lIns="91425" tIns="91425" rIns="91425" bIns="91425" anchor="t" anchorCtr="0">
+            <a:normAutofit/>
+          </a:bodyPr>
+          <a:lstStyle/>
+          <a:p>
+            <a:pPr marL="457200" lvl="0" indent="-342900" algn="l" rtl="0">
+              <a:spcBef>
+                <a:spcPts val="0"/>
+              </a:spcBef>
+              <a:spcAft>
+                <a:spcPts val="0"/>
+              </a:spcAft>
+              <a:buSzPts val="1800"/>
+              <a:buChar char="●"/>
+            </a:pPr>
+            <a:r>
+              <a:rPr lang="en" dirty="0"/>
+              <a:t>Non-uniform PCM quantizers use a non uniform step size that can be determined from the statistical structure of the signal.</a:t>
+            </a:r>
+            <a:endParaRPr dirty="0"/>
+          </a:p>
+          <a:p>
+            <a:pPr marL="457200" lvl="0" indent="-342900" algn="l" rtl="0">
+              <a:spcBef>
+                <a:spcPts val="0"/>
+              </a:spcBef>
+              <a:spcAft>
+                <a:spcPts val="0"/>
+              </a:spcAft>
+              <a:buSzPts val="1800"/>
+              <a:buChar char="●"/>
+            </a:pPr>
+            <a:r>
+              <a:rPr lang="en" dirty="0"/>
+              <a:t>PDF-optimized PCM uses fine step sizes for frequently occurring amplitudes and coarse step sizes for less frequently occurring amplitudes.</a:t>
+            </a:r>
+            <a:endParaRPr dirty="0"/>
+          </a:p>
+          <a:p>
+            <a:pPr marL="457200" lvl="0" indent="-342900" algn="l" rtl="0">
+              <a:spcBef>
+                <a:spcPts val="0"/>
+              </a:spcBef>
+              <a:spcAft>
+                <a:spcPts val="0"/>
+              </a:spcAft>
+              <a:buSzPts val="1800"/>
+              <a:buChar char="●"/>
+            </a:pPr>
+            <a:r>
+              <a:rPr lang="en" dirty="0"/>
+              <a:t>A signal with a Gaussian PDF can be quantized more efficiently by computing the quantization step sizes and the corresponding centroids such that the mean square quantization noise is minimized.</a:t>
+            </a:r>
+            <a:endParaRPr dirty="0"/>
+          </a:p>
+        </p:txBody>
+      </p:sp>
       <p:sp>
         <p:nvSpPr>
           <p:cNvPr id="111" name="Google Shape;111;p21"/>
@@ -8635,6 +8635,55 @@
           </a:p>
         </p:txBody>
       </p:sp>
+      <p:sp>
+        <p:nvSpPr>
+          <p:cNvPr id="2" name="Google Shape;109;p21">
+            <a:extLst>
+              <a:ext uri="{FF2B5EF4-FFF2-40B4-BE49-F238E27FC236}">
+                <a16:creationId xmlns:a16="http://schemas.microsoft.com/office/drawing/2014/main" id="{B66510C7-A327-15F1-7DD8-9CAE5DD70488}"/>
+              </a:ext>
+            </a:extLst>
+          </p:cNvPr>
+          <p:cNvSpPr txBox="1">
+            <a:spLocks noGrp="1"/>
+          </p:cNvSpPr>
+          <p:nvPr>
+            <p:ph type="body" idx="1"/>
+          </p:nvPr>
+        </p:nvSpPr>
+        <p:spPr>
+          <a:xfrm>
+            <a:off x="226175" y="2307675"/>
+            <a:ext cx="5160926" cy="1023875"/>
+          </a:xfrm>
+          <a:prstGeom prst="rect">
+            <a:avLst/>
+          </a:prstGeom>
+        </p:spPr>
+        <p:txBody>
+          <a:bodyPr spcFirstLastPara="1" wrap="square" lIns="91425" tIns="91425" rIns="91425" bIns="91425" anchor="t" anchorCtr="0">
+            <a:normAutofit fontScale="92500"/>
+          </a:bodyPr>
+          <a:lstStyle/>
+          <a:p>
+            <a:pPr marL="114300" lvl="0" indent="0" algn="l" rtl="0">
+              <a:spcBef>
+                <a:spcPts val="0"/>
+              </a:spcBef>
+              <a:spcAft>
+                <a:spcPts val="0"/>
+              </a:spcAft>
+              <a:buSzPts val="1800"/>
+              <a:buNone/>
+            </a:pPr>
+            <a:r>
+              <a:rPr lang="en-US" dirty="0"/>
+              <a:t>g(.) maps non-uniform step sizes to uniform step sizes, such that a simple linear quantizer is used.</a:t>
+            </a:r>
+            <a:endParaRPr dirty="0"/>
+          </a:p>
+        </p:txBody>
+      </p:sp>
     </p:spTree>
   </p:cSld>
   <p:clrMapOvr>
@@ -9359,7 +9408,7 @@
         </p:blipFill>
         <p:spPr>
           <a:xfrm>
-            <a:off x="2964010" y="2905110"/>
+            <a:off x="2964010" y="2940830"/>
             <a:ext cx="2571750" cy="666750"/>
           </a:xfrm>
           <a:prstGeom prst="rect">
@@ -10248,7 +10297,7 @@
         </p:blipFill>
         <p:spPr>
           <a:xfrm>
-            <a:off x="4549125" y="1350429"/>
+            <a:off x="4549125" y="1964797"/>
             <a:ext cx="1699275" cy="517050"/>
           </a:xfrm>
           <a:prstGeom prst="rect">
@@ -10260,6 +10309,48 @@
           </a:ln>
         </p:spPr>
       </p:pic>
+      <p:sp>
+        <p:nvSpPr>
+          <p:cNvPr id="172" name="Google Shape;172;p29"/>
+          <p:cNvSpPr txBox="1">
+            <a:spLocks noGrp="1"/>
+          </p:cNvSpPr>
+          <p:nvPr>
+            <p:ph type="title"/>
+          </p:nvPr>
+        </p:nvSpPr>
+        <p:spPr>
+          <a:xfrm>
+            <a:off x="311700" y="140225"/>
+            <a:ext cx="8520600" cy="572700"/>
+          </a:xfrm>
+          <a:prstGeom prst="rect">
+            <a:avLst/>
+          </a:prstGeom>
+        </p:spPr>
+        <p:txBody>
+          <a:bodyPr spcFirstLastPara="1" wrap="square" lIns="91425" tIns="91425" rIns="91425" bIns="91425" anchor="t" anchorCtr="0">
+            <a:normAutofit fontScale="90000"/>
+          </a:bodyPr>
+          <a:lstStyle/>
+          <a:p>
+            <a:pPr marL="0" lvl="0" indent="0" algn="l" rtl="0">
+              <a:spcBef>
+                <a:spcPts val="0"/>
+              </a:spcBef>
+              <a:spcAft>
+                <a:spcPts val="0"/>
+              </a:spcAft>
+              <a:buNone/>
+            </a:pPr>
+            <a:r>
+              <a:rPr lang="en"/>
+              <a:t>Entropy coding</a:t>
+            </a:r>
+            <a:endParaRPr/>
+          </a:p>
+        </p:txBody>
+      </p:sp>
       <p:sp>
         <p:nvSpPr>
           <p:cNvPr id="171" name="Google Shape;171;p29"/>
@@ -10272,8 +10363,8 @@
         </p:nvSpPr>
         <p:spPr>
           <a:xfrm>
-            <a:off x="311700" y="695275"/>
-            <a:ext cx="8520600" cy="3416400"/>
+            <a:off x="288825" y="561973"/>
+            <a:ext cx="8520600" cy="2612281"/>
           </a:xfrm>
           <a:prstGeom prst="rect">
             <a:avLst/>
@@ -10281,10 +10372,34 @@
         </p:spPr>
         <p:txBody>
           <a:bodyPr spcFirstLastPara="1" wrap="square" lIns="91425" tIns="91425" rIns="91425" bIns="91425" anchor="t" anchorCtr="0">
-            <a:normAutofit/>
+            <a:normAutofit lnSpcReduction="10000"/>
           </a:bodyPr>
           <a:lstStyle/>
           <a:p>
+            <a:pPr marL="114300" lvl="0" indent="0" algn="l" rtl="0">
+              <a:spcBef>
+                <a:spcPts val="0"/>
+              </a:spcBef>
+              <a:spcAft>
+                <a:spcPts val="0"/>
+              </a:spcAft>
+              <a:buSzPts val="1800"/>
+              <a:buNone/>
+            </a:pPr>
+            <a:r>
+              <a:rPr lang="en" b="1" i="1" dirty="0"/>
+              <a:t>Definition</a:t>
+            </a:r>
+            <a:r>
+              <a:rPr lang="en" dirty="0"/>
+              <a:t>: lossless compression based on exploiting statistical correlations of the data.</a:t>
+            </a:r>
+            <a:br>
+              <a:rPr lang="en" dirty="0"/>
+            </a:br>
+            <a:endParaRPr lang="en" dirty="0"/>
+          </a:p>
+          <a:p>
             <a:pPr marL="457200" lvl="0" indent="-342900" algn="l" rtl="0">
               <a:spcBef>
                 <a:spcPts val="0"/>
@@ -10314,7 +10429,7 @@
             </a:pPr>
             <a:r>
               <a:rPr lang="en" dirty="0"/>
-              <a:t>Shannon proved that the minimum number of bits required to encode a message, X, is given by the entropy,                       ,   , where </a:t>
+              <a:t>Shannon proved that the minimum number of bits required to encode a message, X, is given by the entropy,                           , where </a:t>
             </a:r>
             <a:r>
               <a:rPr lang="en" dirty="0" err="1"/>
@@ -10350,60 +10465,6 @@
               <a:t>Typical probability of audio samples: Laplace distribution.</a:t>
             </a:r>
             <a:endParaRPr dirty="0"/>
-          </a:p>
-          <a:p>
-            <a:pPr marL="457200" lvl="0" indent="0" algn="l" rtl="0">
-              <a:spcBef>
-                <a:spcPts val="1200"/>
-              </a:spcBef>
-              <a:spcAft>
-                <a:spcPts val="1200"/>
-              </a:spcAft>
-              <a:buNone/>
-            </a:pPr>
-            <a:endParaRPr dirty="0"/>
-          </a:p>
-        </p:txBody>
-      </p:sp>
-      <p:sp>
-        <p:nvSpPr>
-          <p:cNvPr id="172" name="Google Shape;172;p29"/>
-          <p:cNvSpPr txBox="1">
-            <a:spLocks noGrp="1"/>
-          </p:cNvSpPr>
-          <p:nvPr>
-            <p:ph type="title"/>
-          </p:nvPr>
-        </p:nvSpPr>
-        <p:spPr>
-          <a:xfrm>
-            <a:off x="311700" y="140225"/>
-            <a:ext cx="8520600" cy="572700"/>
-          </a:xfrm>
-          <a:prstGeom prst="rect">
-            <a:avLst/>
-          </a:prstGeom>
-        </p:spPr>
-        <p:txBody>
-          <a:bodyPr spcFirstLastPara="1" wrap="square" lIns="91425" tIns="91425" rIns="91425" bIns="91425" anchor="t" anchorCtr="0">
-            <a:normAutofit fontScale="90000"/>
-          </a:bodyPr>
-          <a:lstStyle/>
-          <a:p>
-            <a:pPr marL="0" lvl="0" indent="0" algn="l" rtl="0">
-              <a:spcBef>
-                <a:spcPts val="0"/>
-              </a:spcBef>
-              <a:spcAft>
-                <a:spcPts val="0"/>
-              </a:spcAft>
-              <a:buNone/>
-            </a:pPr>
-            <a:r>
-              <a:rPr lang="en"/>
-              <a:t>Entropy coding</a:t>
-            </a:r>
-            <a:endParaRPr/>
           </a:p>
         </p:txBody>
       </p:sp>
@@ -10423,7 +10484,7 @@
         </p:blipFill>
         <p:spPr>
           <a:xfrm>
-            <a:off x="117739" y="2567326"/>
+            <a:off x="117739" y="3045962"/>
             <a:ext cx="4752136" cy="1796853"/>
           </a:xfrm>
           <a:prstGeom prst="rect">
@@ -10443,7 +10504,7 @@
         </p:nvSpPr>
         <p:spPr>
           <a:xfrm>
-            <a:off x="3294044" y="4504914"/>
+            <a:off x="3294044" y="4719229"/>
             <a:ext cx="3322200" cy="400079"/>
           </a:xfrm>
           <a:prstGeom prst="rect">
@@ -10470,14 +10531,14 @@
               <a:buNone/>
             </a:pPr>
             <a:r>
-              <a:rPr lang="en" dirty="0">
+              <a:rPr lang="en" i="1" dirty="0">
                 <a:solidFill>
                   <a:schemeClr val="dk2"/>
                 </a:solidFill>
               </a:rPr>
               <a:t>Example of an entropy code</a:t>
             </a:r>
-            <a:endParaRPr dirty="0">
+            <a:endParaRPr i="1" dirty="0">
               <a:solidFill>
                 <a:schemeClr val="dk2"/>
               </a:solidFill>
@@ -10507,7 +10568,7 @@
         </p:blipFill>
         <p:spPr>
           <a:xfrm>
-            <a:off x="4920454" y="2814203"/>
+            <a:off x="4920454" y="3128532"/>
             <a:ext cx="4177363" cy="1452995"/>
           </a:xfrm>
           <a:prstGeom prst="rect">
@@ -11267,7 +11328,7 @@
                   <a:schemeClr val="bg2"/>
                 </a:solidFill>
               </a:rPr>
-              <a:t>Calculate Frequencies: c</a:t>
+              <a:t>Calculate Frequencies: </a:t>
             </a:r>
             <a:r>
               <a:rPr lang="en" dirty="0">
@@ -11275,7 +11336,7 @@
                   <a:schemeClr val="bg2"/>
                 </a:solidFill>
               </a:rPr>
-              <a:t>alculate the frequency of each character in the input array.</a:t>
+              <a:t>calculate the frequency of each character in the input array.</a:t>
             </a:r>
             <a:endParaRPr dirty="0">
               <a:solidFill>
@@ -11779,8 +11840,8 @@
         </p:nvSpPr>
         <p:spPr>
           <a:xfrm>
-            <a:off x="311700" y="950259"/>
-            <a:ext cx="8520600" cy="3618616"/>
+            <a:off x="311700" y="778669"/>
+            <a:ext cx="8520600" cy="4214812"/>
           </a:xfrm>
           <a:prstGeom prst="rect">
             <a:avLst/>
@@ -11788,9 +11849,42 @@
         </p:spPr>
         <p:txBody>
           <a:bodyPr spcFirstLastPara="1" wrap="square" lIns="91425" tIns="91425" rIns="91425" bIns="91425" anchor="t" anchorCtr="0">
-            <a:normAutofit/>
+            <a:normAutofit fontScale="92500" lnSpcReduction="20000"/>
           </a:bodyPr>
           <a:lstStyle/>
+          <a:p>
+            <a:pPr marL="114300" lvl="0" indent="0" algn="l" rtl="0">
+              <a:spcBef>
+                <a:spcPts val="0"/>
+              </a:spcBef>
+              <a:spcAft>
+                <a:spcPts val="0"/>
+              </a:spcAft>
+              <a:buSzPts val="1800"/>
+              <a:buNone/>
+            </a:pPr>
+            <a:r>
+              <a:rPr lang="en-US" b="1" i="1" dirty="0"/>
+              <a:t>Definition: </a:t>
+            </a:r>
+            <a:r>
+              <a:rPr lang="en-US" dirty="0"/>
+              <a:t>binary representation of signals.</a:t>
+            </a:r>
+          </a:p>
+          <a:p>
+            <a:pPr marL="114300" lvl="0" indent="0" algn="l" rtl="0">
+              <a:spcBef>
+                <a:spcPts val="0"/>
+              </a:spcBef>
+              <a:spcAft>
+                <a:spcPts val="0"/>
+              </a:spcAft>
+              <a:buSzPts val="1800"/>
+              <a:buNone/>
+            </a:pPr>
+            <a:endParaRPr lang="en" dirty="0"/>
+          </a:p>
           <a:p>
             <a:pPr marL="457200" lvl="0" indent="-342900" algn="l" rtl="0">
               <a:spcBef>
@@ -11878,8 +11972,13 @@
             </a:pPr>
             <a:r>
               <a:rPr lang="en" sz="1800" dirty="0"/>
-              <a:t>memoryless (ex. PCM) or with memory (DPCM)</a:t>
-            </a:r>
+              <a:t>Memoryless (ex. PCM) or with memory (DPCM). </a:t>
+            </a:r>
+            <a:r>
+              <a:rPr lang="en-US" sz="1800" dirty="0"/>
+              <a:t>Whether the encoding rules rely on past samples or not.</a:t>
+            </a:r>
+            <a:endParaRPr lang="en" sz="1800" dirty="0"/>
           </a:p>
           <a:p>
             <a:pPr lvl="1" indent="-342900">
@@ -11888,8 +11987,13 @@
             </a:pPr>
             <a:r>
               <a:rPr lang="en" sz="1800" dirty="0"/>
-              <a:t>uniform or nonuniform</a:t>
-            </a:r>
+              <a:t>Uniform or nonuniform. </a:t>
+            </a:r>
+            <a:r>
+              <a:rPr lang="en-US" sz="1800" dirty="0"/>
+              <a:t>Based on the step-size or the quantization (discretization) levels employed.</a:t>
+            </a:r>
+            <a:endParaRPr lang="en" sz="1800" dirty="0"/>
           </a:p>
           <a:p>
             <a:pPr lvl="1" indent="-342900">
@@ -11898,7 +12002,7 @@
             </a:pPr>
             <a:r>
               <a:rPr lang="en" sz="1800" dirty="0"/>
-              <a:t>scalar or vector (VQ) </a:t>
+              <a:t>Scalar or vector (VQ). Whether each sampled is quantized individually or blocks of samples and quantized jointly.</a:t>
             </a:r>
           </a:p>
           <a:p>
@@ -11908,7 +12012,7 @@
             </a:pPr>
             <a:r>
               <a:rPr lang="en" sz="1800" dirty="0"/>
-              <a:t>parametric or nonparametric</a:t>
+              <a:t>Parametric or nonparametric. Whether the actual signal is quantized or signal transforms are used before quantization.</a:t>
             </a:r>
             <a:endParaRPr sz="1800" dirty="0"/>
           </a:p>
@@ -11974,10 +12078,10 @@
               <a:buNone/>
             </a:pPr>
             <a:r>
-              <a:rPr lang="en"/>
+              <a:rPr lang="en" dirty="0"/>
               <a:t>Probability density functions</a:t>
             </a:r>
-            <a:endParaRPr/>
+            <a:endParaRPr dirty="0"/>
           </a:p>
         </p:txBody>
       </p:sp>
@@ -11993,8 +12097,8 @@
         </p:nvSpPr>
         <p:spPr>
           <a:xfrm>
-            <a:off x="311700" y="1152475"/>
-            <a:ext cx="8520600" cy="3416400"/>
+            <a:off x="311700" y="992981"/>
+            <a:ext cx="8520600" cy="3575894"/>
           </a:xfrm>
           <a:prstGeom prst="rect">
             <a:avLst/>
@@ -12015,11 +12119,23 @@
               </a:spcAft>
               <a:buNone/>
             </a:pPr>
-            <a:r>
-              <a:rPr lang="en"/>
+            <a:endParaRPr lang="en" dirty="0"/>
+          </a:p>
+          <a:p>
+            <a:pPr marL="0" lvl="0" indent="0" algn="l" rtl="0">
+              <a:spcBef>
+                <a:spcPts val="0"/>
+              </a:spcBef>
+              <a:spcAft>
+                <a:spcPts val="0"/>
+              </a:spcAft>
+              <a:buNone/>
+            </a:pPr>
+            <a:r>
+              <a:rPr lang="en" dirty="0"/>
               <a:t>A random process can be characterized by its probability density function (PDF), which is a non-negative function p(x), whose properties are</a:t>
             </a:r>
-            <a:endParaRPr/>
+            <a:endParaRPr dirty="0"/>
           </a:p>
           <a:p>
             <a:pPr marL="0" lvl="0" indent="0" algn="l" rtl="0">
@@ -12031,7 +12147,7 @@
               </a:spcAft>
               <a:buNone/>
             </a:pPr>
-            <a:endParaRPr/>
+            <a:endParaRPr dirty="0"/>
           </a:p>
           <a:p>
             <a:pPr marL="0" lvl="0" indent="0" algn="l" rtl="0">
@@ -12044,10 +12160,10 @@
               <a:buNone/>
             </a:pPr>
             <a:r>
-              <a:rPr lang="en"/>
+              <a:rPr lang="en" dirty="0"/>
               <a:t>and</a:t>
             </a:r>
-            <a:endParaRPr/>
+            <a:endParaRPr dirty="0"/>
           </a:p>
           <a:p>
             <a:pPr marL="0" lvl="0" indent="0" algn="l" rtl="0">
@@ -12059,7 +12175,7 @@
               </a:spcAft>
               <a:buNone/>
             </a:pPr>
-            <a:endParaRPr/>
+            <a:endParaRPr dirty="0"/>
           </a:p>
           <a:p>
             <a:pPr marL="0" lvl="0" indent="0" algn="l" rtl="0">
@@ -12072,10 +12188,10 @@
               <a:buNone/>
             </a:pPr>
             <a:r>
-              <a:rPr lang="en"/>
+              <a:rPr lang="en" dirty="0"/>
               <a:t>the PDF area, from x1 to x2, is the probability that the random variable X is observed in this range. </a:t>
             </a:r>
-            <a:endParaRPr/>
+            <a:endParaRPr dirty="0"/>
           </a:p>
         </p:txBody>
       </p:sp>
@@ -12095,7 +12211,7 @@
         </p:blipFill>
         <p:spPr>
           <a:xfrm>
-            <a:off x="3668088" y="1924723"/>
+            <a:off x="3660944" y="2129775"/>
             <a:ext cx="1609725" cy="638175"/>
           </a:xfrm>
           <a:prstGeom prst="rect">
@@ -12123,7 +12239,7 @@
         </p:blipFill>
         <p:spPr>
           <a:xfrm>
-            <a:off x="2993713" y="2767950"/>
+            <a:off x="2993713" y="2925113"/>
             <a:ext cx="2790825" cy="666750"/>
           </a:xfrm>
           <a:prstGeom prst="rect">
@@ -12921,6 +13037,34 @@
           <a:chExt cx="0" cy="0"/>
         </a:xfrm>
       </p:grpSpPr>
+      <p:pic>
+        <p:nvPicPr>
+          <p:cNvPr id="97" name="Google Shape;97;p19"/>
+          <p:cNvPicPr preferRelativeResize="0"/>
+          <p:nvPr/>
+        </p:nvPicPr>
+        <p:blipFill>
+          <a:blip r:embed="rId3">
+            <a:alphaModFix/>
+          </a:blip>
+          <a:stretch>
+            <a:fillRect/>
+          </a:stretch>
+        </p:blipFill>
+        <p:spPr>
+          <a:xfrm>
+            <a:off x="2090663" y="1900700"/>
+            <a:ext cx="2427987" cy="456225"/>
+          </a:xfrm>
+          <a:prstGeom prst="rect">
+            <a:avLst/>
+          </a:prstGeom>
+          <a:noFill/>
+          <a:ln>
+            <a:noFill/>
+          </a:ln>
+        </p:spPr>
+      </p:pic>
       <p:sp>
         <p:nvSpPr>
           <p:cNvPr id="93" name="Google Shape;93;p19"/>
@@ -13089,7 +13233,7 @@
           <p:nvPr/>
         </p:nvPicPr>
         <p:blipFill rotWithShape="1">
-          <a:blip r:embed="rId3">
+          <a:blip r:embed="rId4">
             <a:alphaModFix/>
           </a:blip>
           <a:srcRect t="14170"/>
@@ -13116,7 +13260,7 @@
           <p:nvPr/>
         </p:nvPicPr>
         <p:blipFill>
-          <a:blip r:embed="rId4">
+          <a:blip r:embed="rId5">
             <a:alphaModFix/>
           </a:blip>
           <a:stretch>
@@ -13144,7 +13288,7 @@
           <p:nvPr/>
         </p:nvPicPr>
         <p:blipFill rotWithShape="1">
-          <a:blip r:embed="rId5">
+          <a:blip r:embed="rId6">
             <a:alphaModFix/>
           </a:blip>
           <a:srcRect b="6576"/>
@@ -13154,34 +13298,6 @@
           <a:xfrm>
             <a:off x="4965206" y="3177906"/>
             <a:ext cx="1804375" cy="456225"/>
-          </a:xfrm>
-          <a:prstGeom prst="rect">
-            <a:avLst/>
-          </a:prstGeom>
-          <a:noFill/>
-          <a:ln>
-            <a:noFill/>
-          </a:ln>
-        </p:spPr>
-      </p:pic>
-      <p:pic>
-        <p:nvPicPr>
-          <p:cNvPr id="97" name="Google Shape;97;p19"/>
-          <p:cNvPicPr preferRelativeResize="0"/>
-          <p:nvPr/>
-        </p:nvPicPr>
-        <p:blipFill>
-          <a:blip r:embed="rId6">
-            <a:alphaModFix/>
-          </a:blip>
-          <a:stretch>
-            <a:fillRect/>
-          </a:stretch>
-        </p:blipFill>
-        <p:spPr>
-          <a:xfrm>
-            <a:off x="2090663" y="1900700"/>
-            <a:ext cx="2427987" cy="456225"/>
           </a:xfrm>
           <a:prstGeom prst="rect">
             <a:avLst/>

</xml_diff>

<commit_message>
added details in slides
</commit_message>
<xml_diff>
--- a/lectures/2. Quantization and _entropy coding.pptx
+++ b/lectures/2. Quantization and _entropy coding.pptx
@@ -8654,7 +8654,7 @@
         <p:spPr>
           <a:xfrm>
             <a:off x="226175" y="2307675"/>
-            <a:ext cx="5160926" cy="1023875"/>
+            <a:ext cx="5160926" cy="2330250"/>
           </a:xfrm>
           <a:prstGeom prst="rect">
             <a:avLst/>
@@ -8662,7 +8662,7 @@
         </p:spPr>
         <p:txBody>
           <a:bodyPr spcFirstLastPara="1" wrap="square" lIns="91425" tIns="91425" rIns="91425" bIns="91425" anchor="t" anchorCtr="0">
-            <a:normAutofit fontScale="92500"/>
+            <a:normAutofit fontScale="77500" lnSpcReduction="20000"/>
           </a:bodyPr>
           <a:lstStyle/>
           <a:p>
@@ -8679,6 +8679,74 @@
             <a:r>
               <a:rPr lang="en-US" dirty="0"/>
               <a:t>g(.) maps non-uniform step sizes to uniform step sizes, such that a simple linear quantizer is used.</a:t>
+            </a:r>
+          </a:p>
+          <a:p>
+            <a:pPr marL="114300" lvl="0" indent="0" algn="l" rtl="0">
+              <a:spcBef>
+                <a:spcPts val="0"/>
+              </a:spcBef>
+              <a:spcAft>
+                <a:spcPts val="0"/>
+              </a:spcAft>
+              <a:buSzPts val="1800"/>
+              <a:buNone/>
+            </a:pPr>
+            <a:br>
+              <a:rPr lang="en-US" dirty="0"/>
+            </a:br>
+            <a:r>
+              <a:rPr lang="en-US" dirty="0"/>
+              <a:t>Two telephony standards have been developed based on logarithmic </a:t>
+            </a:r>
+            <a:r>
+              <a:rPr lang="en-US" dirty="0" err="1"/>
+              <a:t>companding</a:t>
+            </a:r>
+            <a:r>
+              <a:rPr lang="en-US" dirty="0"/>
+              <a:t>, i.e., the </a:t>
+            </a:r>
+            <a:r>
+              <a:rPr lang="el-GR" dirty="0"/>
+              <a:t>μ-</a:t>
+            </a:r>
+            <a:r>
+              <a:rPr lang="en-US" dirty="0"/>
+              <a:t>law (in USA) and the A-law (in Europe).</a:t>
+            </a:r>
+          </a:p>
+          <a:p>
+            <a:pPr marL="114300" lvl="0" indent="0" algn="l" rtl="0">
+              <a:spcBef>
+                <a:spcPts val="0"/>
+              </a:spcBef>
+              <a:spcAft>
+                <a:spcPts val="0"/>
+              </a:spcAft>
+              <a:buSzPts val="1800"/>
+              <a:buNone/>
+            </a:pPr>
+            <a:endParaRPr lang="en-US" dirty="0"/>
+          </a:p>
+          <a:p>
+            <a:pPr marL="114300" lvl="0" indent="0" algn="l" rtl="0">
+              <a:spcBef>
+                <a:spcPts val="0"/>
+              </a:spcBef>
+              <a:spcAft>
+                <a:spcPts val="0"/>
+              </a:spcAft>
+              <a:buSzPts val="1800"/>
+              <a:buNone/>
+            </a:pPr>
+            <a:r>
+              <a:rPr lang="en-US" dirty="0" err="1"/>
+              <a:t>Companding</a:t>
+            </a:r>
+            <a:r>
+              <a:rPr lang="en-US" dirty="0"/>
+              <a:t> schemes have been found to reduce bit rates, without degradation, by as much as 4 bits/sample relative to uniform PCM.</a:t>
             </a:r>
             <a:endParaRPr dirty="0"/>
           </a:p>
@@ -10297,7 +10365,7 @@
         </p:blipFill>
         <p:spPr>
           <a:xfrm>
-            <a:off x="4549125" y="1964797"/>
+            <a:off x="4549125" y="1821918"/>
             <a:ext cx="1699275" cy="517050"/>
           </a:xfrm>
           <a:prstGeom prst="rect">
@@ -10309,6 +10377,119 @@
           </a:ln>
         </p:spPr>
       </p:pic>
+      <p:sp>
+        <p:nvSpPr>
+          <p:cNvPr id="171" name="Google Shape;171;p29"/>
+          <p:cNvSpPr txBox="1">
+            <a:spLocks noGrp="1"/>
+          </p:cNvSpPr>
+          <p:nvPr>
+            <p:ph type="body" idx="1"/>
+          </p:nvPr>
+        </p:nvSpPr>
+        <p:spPr>
+          <a:xfrm>
+            <a:off x="288825" y="561973"/>
+            <a:ext cx="8520600" cy="2612281"/>
+          </a:xfrm>
+          <a:prstGeom prst="rect">
+            <a:avLst/>
+          </a:prstGeom>
+        </p:spPr>
+        <p:txBody>
+          <a:bodyPr spcFirstLastPara="1" wrap="square" lIns="91425" tIns="91425" rIns="91425" bIns="91425" anchor="t" anchorCtr="0">
+            <a:normAutofit/>
+          </a:bodyPr>
+          <a:lstStyle/>
+          <a:p>
+            <a:pPr marL="114300" lvl="0" indent="0" algn="l" rtl="0">
+              <a:spcBef>
+                <a:spcPts val="0"/>
+              </a:spcBef>
+              <a:spcAft>
+                <a:spcPts val="0"/>
+              </a:spcAft>
+              <a:buSzPts val="1800"/>
+              <a:buNone/>
+            </a:pPr>
+            <a:r>
+              <a:rPr lang="en" b="1" i="1" dirty="0"/>
+              <a:t>Definition</a:t>
+            </a:r>
+            <a:r>
+              <a:rPr lang="en" dirty="0"/>
+              <a:t>: lossless compression based on exploiting statistical correlations of the data.</a:t>
+            </a:r>
+          </a:p>
+          <a:p>
+            <a:pPr marL="457200" lvl="0" indent="-342900" algn="l" rtl="0">
+              <a:spcBef>
+                <a:spcPts val="0"/>
+              </a:spcBef>
+              <a:spcAft>
+                <a:spcPts val="0"/>
+              </a:spcAft>
+              <a:buSzPts val="1800"/>
+              <a:buChar char="●"/>
+            </a:pPr>
+            <a:r>
+              <a:rPr lang="en" dirty="0"/>
+              <a:t>Entropy is a measure of uncertainty of a random variable.</a:t>
+            </a:r>
+            <a:endParaRPr dirty="0"/>
+          </a:p>
+          <a:p>
+            <a:pPr marL="457200" lvl="0" indent="-342900" algn="l" rtl="0">
+              <a:spcBef>
+                <a:spcPts val="0"/>
+              </a:spcBef>
+              <a:spcAft>
+                <a:spcPts val="0"/>
+              </a:spcAft>
+              <a:buSzPts val="1800"/>
+              <a:buChar char="●"/>
+            </a:pPr>
+            <a:r>
+              <a:rPr lang="en" dirty="0"/>
+              <a:t>Shannon proved that the minimum number of bits required to encode a message, X, is given by the entropy,                           , where </a:t>
+            </a:r>
+            <a:r>
+              <a:rPr lang="en" dirty="0" err="1"/>
+              <a:t>p_i</a:t>
+            </a:r>
+            <a:r>
+              <a:rPr lang="en" dirty="0"/>
+              <a:t> is the probability that the </a:t>
+            </a:r>
+            <a:r>
+              <a:rPr lang="en" dirty="0" err="1"/>
+              <a:t>i-th</a:t>
+            </a:r>
+            <a:r>
+              <a:rPr lang="en" dirty="0"/>
+              <a:t> symbol is transmitted.</a:t>
+            </a:r>
+            <a:endParaRPr dirty="0"/>
+          </a:p>
+          <a:p>
+            <a:pPr marL="457200" lvl="0" indent="-342900" algn="l" rtl="0">
+              <a:spcBef>
+                <a:spcPts val="0"/>
+              </a:spcBef>
+              <a:spcAft>
+                <a:spcPts val="0"/>
+              </a:spcAft>
+              <a:buSzPts val="1800"/>
+              <a:buChar char="●"/>
+            </a:pPr>
+            <a:r>
+              <a:rPr lang="en" dirty="0"/>
+              <a:t>Typical probability of audio samples: Laplace distribution.</a:t>
+            </a:r>
+            <a:endParaRPr dirty="0"/>
+          </a:p>
+        </p:txBody>
+      </p:sp>
       <p:sp>
         <p:nvSpPr>
           <p:cNvPr id="172" name="Google Shape;172;p29"/>
@@ -10348,123 +10529,6 @@
               <a:t>Entropy coding</a:t>
             </a:r>
             <a:endParaRPr/>
-          </a:p>
-        </p:txBody>
-      </p:sp>
-      <p:sp>
-        <p:nvSpPr>
-          <p:cNvPr id="171" name="Google Shape;171;p29"/>
-          <p:cNvSpPr txBox="1">
-            <a:spLocks noGrp="1"/>
-          </p:cNvSpPr>
-          <p:nvPr>
-            <p:ph type="body" idx="1"/>
-          </p:nvPr>
-        </p:nvSpPr>
-        <p:spPr>
-          <a:xfrm>
-            <a:off x="288825" y="561973"/>
-            <a:ext cx="8520600" cy="2612281"/>
-          </a:xfrm>
-          <a:prstGeom prst="rect">
-            <a:avLst/>
-          </a:prstGeom>
-        </p:spPr>
-        <p:txBody>
-          <a:bodyPr spcFirstLastPara="1" wrap="square" lIns="91425" tIns="91425" rIns="91425" bIns="91425" anchor="t" anchorCtr="0">
-            <a:normAutofit lnSpcReduction="10000"/>
-          </a:bodyPr>
-          <a:lstStyle/>
-          <a:p>
-            <a:pPr marL="114300" lvl="0" indent="0" algn="l" rtl="0">
-              <a:spcBef>
-                <a:spcPts val="0"/>
-              </a:spcBef>
-              <a:spcAft>
-                <a:spcPts val="0"/>
-              </a:spcAft>
-              <a:buSzPts val="1800"/>
-              <a:buNone/>
-            </a:pPr>
-            <a:r>
-              <a:rPr lang="en" b="1" i="1" dirty="0"/>
-              <a:t>Definition</a:t>
-            </a:r>
-            <a:r>
-              <a:rPr lang="en" dirty="0"/>
-              <a:t>: lossless compression based on exploiting statistical correlations of the data.</a:t>
-            </a:r>
-            <a:br>
-              <a:rPr lang="en" dirty="0"/>
-            </a:br>
-            <a:endParaRPr lang="en" dirty="0"/>
-          </a:p>
-          <a:p>
-            <a:pPr marL="457200" lvl="0" indent="-342900" algn="l" rtl="0">
-              <a:spcBef>
-                <a:spcPts val="0"/>
-              </a:spcBef>
-              <a:spcAft>
-                <a:spcPts val="0"/>
-              </a:spcAft>
-              <a:buSzPts val="1800"/>
-              <a:buChar char="●"/>
-            </a:pPr>
-            <a:r>
-              <a:rPr lang="en" dirty="0"/>
-              <a:t>Entropy is a measure of uncertainty of a random variable.</a:t>
-            </a:r>
-            <a:endParaRPr dirty="0"/>
-          </a:p>
-          <a:p>
-            <a:pPr marL="457200" lvl="0" indent="-342900" algn="l" rtl="0">
-              <a:spcBef>
-                <a:spcPts val="0"/>
-              </a:spcBef>
-              <a:spcAft>
-                <a:spcPts val="0"/>
-              </a:spcAft>
-              <a:buSzPts val="1800"/>
-              <a:buChar char="●"/>
-            </a:pPr>
-            <a:r>
-              <a:rPr lang="en" dirty="0"/>
-              <a:t>Shannon proved that the minimum number of bits required to encode a message, X, is given by the entropy,                           , where </a:t>
-            </a:r>
-            <a:r>
-              <a:rPr lang="en" dirty="0" err="1"/>
-              <a:t>p_i</a:t>
-            </a:r>
-            <a:r>
-              <a:rPr lang="en" dirty="0"/>
-              <a:t> is the probability that the </a:t>
-            </a:r>
-            <a:r>
-              <a:rPr lang="en" dirty="0" err="1"/>
-              <a:t>i-th</a:t>
-            </a:r>
-            <a:r>
-              <a:rPr lang="en" dirty="0"/>
-              <a:t> symbol is transmitted.</a:t>
-            </a:r>
-            <a:endParaRPr dirty="0"/>
-          </a:p>
-          <a:p>
-            <a:pPr marL="457200" lvl="0" indent="-342900" algn="l" rtl="0">
-              <a:spcBef>
-                <a:spcPts val="0"/>
-              </a:spcBef>
-              <a:spcAft>
-                <a:spcPts val="0"/>
-              </a:spcAft>
-              <a:buSzPts val="1800"/>
-              <a:buChar char="●"/>
-            </a:pPr>
-            <a:r>
-              <a:rPr lang="en" dirty="0"/>
-              <a:t>Typical probability of audio samples: Laplace distribution.</a:t>
-            </a:r>
-            <a:endParaRPr dirty="0"/>
           </a:p>
         </p:txBody>
       </p:sp>
@@ -10576,6 +10640,62 @@
           </a:prstGeom>
         </p:spPr>
       </p:pic>
+      <p:sp>
+        <p:nvSpPr>
+          <p:cNvPr id="2" name="Google Shape;174;p29">
+            <a:extLst>
+              <a:ext uri="{FF2B5EF4-FFF2-40B4-BE49-F238E27FC236}">
+                <a16:creationId xmlns:a16="http://schemas.microsoft.com/office/drawing/2014/main" id="{6010CAAE-E5D1-A70F-6D52-FD0315DBA7D2}"/>
+              </a:ext>
+            </a:extLst>
+          </p:cNvPr>
+          <p:cNvSpPr txBox="1"/>
+          <p:nvPr/>
+        </p:nvSpPr>
+        <p:spPr>
+          <a:xfrm>
+            <a:off x="5627362" y="4301938"/>
+            <a:ext cx="3470455" cy="338524"/>
+          </a:xfrm>
+          <a:prstGeom prst="rect">
+            <a:avLst/>
+          </a:prstGeom>
+          <a:noFill/>
+          <a:ln>
+            <a:noFill/>
+          </a:ln>
+        </p:spPr>
+        <p:txBody>
+          <a:bodyPr spcFirstLastPara="1" wrap="square" lIns="91425" tIns="91425" rIns="91425" bIns="91425" anchor="t" anchorCtr="0">
+            <a:spAutoFit/>
+          </a:bodyPr>
+          <a:lstStyle/>
+          <a:p>
+            <a:pPr marL="0" lvl="0" indent="0" algn="ctr" rtl="0">
+              <a:spcBef>
+                <a:spcPts val="0"/>
+              </a:spcBef>
+              <a:spcAft>
+                <a:spcPts val="0"/>
+              </a:spcAft>
+              <a:buNone/>
+            </a:pPr>
+            <a:r>
+              <a:rPr lang="en" sz="1000" b="1" i="1" dirty="0">
+                <a:solidFill>
+                  <a:schemeClr val="dk2"/>
+                </a:solidFill>
+              </a:rPr>
+              <a:t>-&gt; 2 bits with entropy code, 3 bits with uniform code.</a:t>
+            </a:r>
+            <a:endParaRPr sz="1000" b="1" i="1" dirty="0">
+              <a:solidFill>
+                <a:schemeClr val="dk2"/>
+              </a:solidFill>
+            </a:endParaRPr>
+          </a:p>
+        </p:txBody>
+      </p:sp>
     </p:spTree>
   </p:cSld>
   <p:clrMapOvr>
@@ -11849,20 +11969,10 @@
         </p:spPr>
         <p:txBody>
           <a:bodyPr spcFirstLastPara="1" wrap="square" lIns="91425" tIns="91425" rIns="91425" bIns="91425" anchor="t" anchorCtr="0">
-            <a:normAutofit fontScale="92500" lnSpcReduction="20000"/>
+            <a:normAutofit/>
           </a:bodyPr>
           <a:lstStyle/>
           <a:p>
-            <a:pPr marL="114300" lvl="0" indent="0" algn="l" rtl="0">
-              <a:spcBef>
-                <a:spcPts val="0"/>
-              </a:spcBef>
-              <a:spcAft>
-                <a:spcPts val="0"/>
-              </a:spcAft>
-              <a:buSzPts val="1800"/>
-              <a:buNone/>
-            </a:pPr>
             <a:r>
               <a:rPr lang="en-US" b="1" i="1" dirty="0"/>
               <a:t>Definition: </a:t>
@@ -11873,29 +11983,7 @@
             </a:r>
           </a:p>
           <a:p>
-            <a:pPr marL="114300" lvl="0" indent="0" algn="l" rtl="0">
-              <a:spcBef>
-                <a:spcPts val="0"/>
-              </a:spcBef>
-              <a:spcAft>
-                <a:spcPts val="0"/>
-              </a:spcAft>
-              <a:buSzPts val="1800"/>
-              <a:buNone/>
-            </a:pPr>
-            <a:endParaRPr lang="en" dirty="0"/>
-          </a:p>
-          <a:p>
-            <a:pPr marL="457200" lvl="0" indent="-342900" algn="l" rtl="0">
-              <a:spcBef>
-                <a:spcPts val="0"/>
-              </a:spcBef>
-              <a:spcAft>
-                <a:spcPts val="0"/>
-              </a:spcAft>
-              <a:buSzPts val="1800"/>
-              <a:buChar char="●"/>
-            </a:pPr>
+            <a:pPr lvl="1"/>
             <a:r>
               <a:rPr lang="en" dirty="0"/>
               <a:t>Data reduction by removing irrelevance.</a:t>
@@ -11903,16 +11991,7 @@
             <a:endParaRPr dirty="0"/>
           </a:p>
           <a:p>
-            <a:pPr marL="457200" lvl="0" indent="-342900" algn="l" rtl="0">
-              <a:spcBef>
-                <a:spcPts val="0"/>
-              </a:spcBef>
-              <a:spcAft>
-                <a:spcPts val="0"/>
-              </a:spcAft>
-              <a:buSzPts val="1800"/>
-              <a:buChar char="●"/>
-            </a:pPr>
+            <a:pPr lvl="1"/>
             <a:r>
               <a:rPr lang="en" dirty="0"/>
               <a:t>Explicit control of quantization distortion according to time/frequency-dependent masking threshold (perceptual coder).</a:t>
@@ -11920,16 +11999,7 @@
             <a:endParaRPr dirty="0"/>
           </a:p>
           <a:p>
-            <a:pPr marL="457200" lvl="0" indent="-342900" algn="l" rtl="0">
-              <a:spcBef>
-                <a:spcPts val="0"/>
-              </a:spcBef>
-              <a:spcAft>
-                <a:spcPts val="0"/>
-              </a:spcAft>
-              <a:buSzPts val="1800"/>
-              <a:buChar char="●"/>
-            </a:pPr>
+            <a:pPr lvl="1"/>
             <a:r>
               <a:rPr lang="en" dirty="0"/>
               <a:t>High variability in local SNR (e.g. 0db ..&gt; 30db).</a:t>
@@ -11971,14 +12041,13 @@
               <a:buChar char="●"/>
             </a:pPr>
             <a:r>
-              <a:rPr lang="en" sz="1800" dirty="0"/>
+              <a:rPr lang="en" dirty="0"/>
               <a:t>Memoryless (ex. PCM) or with memory (DPCM). </a:t>
             </a:r>
             <a:r>
-              <a:rPr lang="en-US" sz="1800" dirty="0"/>
+              <a:rPr lang="en-US" dirty="0"/>
               <a:t>Whether the encoding rules rely on past samples or not.</a:t>
             </a:r>
-            <a:endParaRPr lang="en" sz="1800" dirty="0"/>
           </a:p>
           <a:p>
             <a:pPr lvl="1" indent="-342900">
@@ -11986,14 +12055,13 @@
               <a:buChar char="●"/>
             </a:pPr>
             <a:r>
-              <a:rPr lang="en" sz="1800" dirty="0"/>
+              <a:rPr lang="en" dirty="0"/>
               <a:t>Uniform or nonuniform. </a:t>
             </a:r>
             <a:r>
-              <a:rPr lang="en-US" sz="1800" dirty="0"/>
+              <a:rPr lang="en-US" dirty="0"/>
               <a:t>Based on the step-size or the quantization (discretization) levels employed.</a:t>
             </a:r>
-            <a:endParaRPr lang="en" sz="1800" dirty="0"/>
           </a:p>
           <a:p>
             <a:pPr lvl="1" indent="-342900">
@@ -12001,7 +12069,7 @@
               <a:buChar char="●"/>
             </a:pPr>
             <a:r>
-              <a:rPr lang="en" sz="1800" dirty="0"/>
+              <a:rPr lang="en" dirty="0"/>
               <a:t>Scalar or vector (VQ). Whether each sampled is quantized individually or blocks of samples and quantized jointly.</a:t>
             </a:r>
           </a:p>
@@ -12011,10 +12079,10 @@
               <a:buChar char="●"/>
             </a:pPr>
             <a:r>
-              <a:rPr lang="en" sz="1800" dirty="0"/>
+              <a:rPr lang="en" dirty="0"/>
               <a:t>Parametric or nonparametric. Whether the actual signal is quantized or signal transforms are used before quantization.</a:t>
             </a:r>
-            <a:endParaRPr sz="1800" dirty="0"/>
+            <a:endParaRPr dirty="0"/>
           </a:p>
         </p:txBody>
       </p:sp>
@@ -13269,7 +13337,7 @@
         </p:blipFill>
         <p:spPr>
           <a:xfrm>
-            <a:off x="6118850" y="2762750"/>
+            <a:off x="6118850" y="2769894"/>
             <a:ext cx="2287250" cy="521475"/>
           </a:xfrm>
           <a:prstGeom prst="rect">

</xml_diff>